<commit_message>
[GIT]Add Git large files (LFS)
</commit_message>
<xml_diff>
--- a/docs/apresentacao_tcc_fia_trading_advisor.pptx
+++ b/docs/apresentacao_tcc_fia_trading_advisor.pptx
@@ -5,7 +5,7 @@
     <p:sldMasterId id="2147483698" r:id="rId1"/>
   </p:sldMasterIdLst>
   <p:notesMasterIdLst>
-    <p:notesMasterId r:id="rId21"/>
+    <p:notesMasterId r:id="rId23"/>
   </p:notesMasterIdLst>
   <p:sldIdLst>
     <p:sldId id="267" r:id="rId2"/>
@@ -27,6 +27,8 @@
     <p:sldId id="308" r:id="rId18"/>
     <p:sldId id="311" r:id="rId19"/>
     <p:sldId id="315" r:id="rId20"/>
+    <p:sldId id="317" r:id="rId21"/>
+    <p:sldId id="318" r:id="rId22"/>
   </p:sldIdLst>
   <p:sldSz cx="12192000" cy="6858000"/>
   <p:notesSz cx="6858000" cy="9144000"/>
@@ -818,6 +820,115 @@
         </p:txBody>
       </p:sp>
     </p:spTree>
+  </p:cSld>
+  <p:clrMapOvr>
+    <a:masterClrMapping/>
+  </p:clrMapOvr>
+</p:notes>
+</file>
+
+<file path=ppt/notesSlides/notesSlide2.xml><?xml version="1.0" encoding="utf-8"?>
+<p:notes xmlns:a="http://schemas.openxmlformats.org/drawingml/2006/main" xmlns:r="http://schemas.openxmlformats.org/officeDocument/2006/relationships" xmlns:p="http://schemas.openxmlformats.org/presentationml/2006/main" showMasterSp="0" showMasterPhAnim="0">
+  <p:cSld>
+    <p:spTree>
+      <p:nvGrpSpPr>
+        <p:cNvPr id="1" name="Shape 51"/>
+        <p:cNvGrpSpPr/>
+        <p:nvPr/>
+      </p:nvGrpSpPr>
+      <p:grpSpPr>
+        <a:xfrm>
+          <a:off x="0" y="0"/>
+          <a:ext cx="0" cy="0"/>
+          <a:chOff x="0" y="0"/>
+          <a:chExt cx="0" cy="0"/>
+        </a:xfrm>
+      </p:grpSpPr>
+      <p:sp>
+        <p:nvSpPr>
+          <p:cNvPr id="52" name="Google Shape;52;p:notes"/>
+          <p:cNvSpPr>
+            <a:spLocks noGrp="1" noRot="1" noChangeAspect="1"/>
+          </p:cNvSpPr>
+          <p:nvPr>
+            <p:ph type="sldImg" idx="2"/>
+          </p:nvPr>
+        </p:nvSpPr>
+        <p:spPr>
+          <a:xfrm>
+            <a:off x="381000" y="685800"/>
+            <a:ext cx="6096000" cy="3429000"/>
+          </a:xfrm>
+          <a:custGeom>
+            <a:avLst/>
+            <a:gdLst/>
+            <a:ahLst/>
+            <a:cxnLst/>
+            <a:rect l="l" t="t" r="r" b="b"/>
+            <a:pathLst>
+              <a:path w="120000" h="120000" extrusionOk="0">
+                <a:moveTo>
+                  <a:pt x="0" y="0"/>
+                </a:moveTo>
+                <a:lnTo>
+                  <a:pt x="120000" y="0"/>
+                </a:lnTo>
+                <a:lnTo>
+                  <a:pt x="120000" y="120000"/>
+                </a:lnTo>
+                <a:lnTo>
+                  <a:pt x="0" y="120000"/>
+                </a:lnTo>
+                <a:close/>
+              </a:path>
+            </a:pathLst>
+          </a:custGeom>
+        </p:spPr>
+      </p:sp>
+      <p:sp>
+        <p:nvSpPr>
+          <p:cNvPr id="53" name="Google Shape;53;p:notes"/>
+          <p:cNvSpPr txBox="1">
+            <a:spLocks noGrp="1"/>
+          </p:cNvSpPr>
+          <p:nvPr>
+            <p:ph type="body" idx="1"/>
+          </p:nvPr>
+        </p:nvSpPr>
+        <p:spPr>
+          <a:xfrm>
+            <a:off x="685800" y="4343400"/>
+            <a:ext cx="5486400" cy="4114800"/>
+          </a:xfrm>
+          <a:prstGeom prst="rect">
+            <a:avLst/>
+          </a:prstGeom>
+        </p:spPr>
+        <p:txBody>
+          <a:bodyPr spcFirstLastPara="1" wrap="square" lIns="91425" tIns="91425" rIns="91425" bIns="91425" anchor="t" anchorCtr="0">
+            <a:noAutofit/>
+          </a:bodyPr>
+          <a:lstStyle/>
+          <a:p>
+            <a:pPr marL="0" lvl="0" indent="0" algn="l" rtl="0">
+              <a:spcBef>
+                <a:spcPts val="0"/>
+              </a:spcBef>
+              <a:spcAft>
+                <a:spcPts val="0"/>
+              </a:spcAft>
+              <a:buNone/>
+            </a:pPr>
+            <a:endParaRPr/>
+          </a:p>
+        </p:txBody>
+      </p:sp>
+    </p:spTree>
+    <p:extLst>
+      <p:ext uri="{BB962C8B-B14F-4D97-AF65-F5344CB8AC3E}">
+        <p14:creationId xmlns:p14="http://schemas.microsoft.com/office/powerpoint/2010/main" val="306647554"/>
+      </p:ext>
+    </p:extLst>
   </p:cSld>
   <p:clrMapOvr>
     <a:masterClrMapping/>
@@ -3602,7 +3713,7 @@
 </file>
 
 <file path=ppt/slides/slide10.xml><?xml version="1.0" encoding="utf-8"?>
-<p:sld xmlns:a="http://schemas.openxmlformats.org/drawingml/2006/main" xmlns:r="http://schemas.openxmlformats.org/officeDocument/2006/relationships" xmlns:p="http://schemas.openxmlformats.org/presentationml/2006/main">
+<p:sld xmlns:a="http://schemas.openxmlformats.org/drawingml/2006/main" xmlns:r="http://schemas.openxmlformats.org/officeDocument/2006/relationships" xmlns:p="http://schemas.openxmlformats.org/presentationml/2006/main" show="0">
   <p:cSld>
     <p:spTree>
       <p:nvGrpSpPr>
@@ -5527,7 +5638,7 @@
 </file>
 
 <file path=ppt/slides/slide11.xml><?xml version="1.0" encoding="utf-8"?>
-<p:sld xmlns:a="http://schemas.openxmlformats.org/drawingml/2006/main" xmlns:r="http://schemas.openxmlformats.org/officeDocument/2006/relationships" xmlns:p="http://schemas.openxmlformats.org/presentationml/2006/main">
+<p:sld xmlns:a="http://schemas.openxmlformats.org/drawingml/2006/main" xmlns:r="http://schemas.openxmlformats.org/officeDocument/2006/relationships" xmlns:p="http://schemas.openxmlformats.org/presentationml/2006/main" show="0">
   <p:cSld>
     <p:spTree>
       <p:nvGrpSpPr>
@@ -8291,7 +8402,7 @@
 </file>
 
 <file path=ppt/slides/slide14.xml><?xml version="1.0" encoding="utf-8"?>
-<p:sld xmlns:a="http://schemas.openxmlformats.org/drawingml/2006/main" xmlns:r="http://schemas.openxmlformats.org/officeDocument/2006/relationships" xmlns:p="http://schemas.openxmlformats.org/presentationml/2006/main">
+<p:sld xmlns:a="http://schemas.openxmlformats.org/drawingml/2006/main" xmlns:r="http://schemas.openxmlformats.org/officeDocument/2006/relationships" xmlns:p="http://schemas.openxmlformats.org/presentationml/2006/main" show="0">
   <p:cSld>
     <p:spTree>
       <p:nvGrpSpPr>
@@ -9768,7 +9879,7 @@
 </file>
 
 <file path=ppt/slides/slide15.xml><?xml version="1.0" encoding="utf-8"?>
-<p:sld xmlns:a="http://schemas.openxmlformats.org/drawingml/2006/main" xmlns:r="http://schemas.openxmlformats.org/officeDocument/2006/relationships" xmlns:p="http://schemas.openxmlformats.org/presentationml/2006/main">
+<p:sld xmlns:a="http://schemas.openxmlformats.org/drawingml/2006/main" xmlns:r="http://schemas.openxmlformats.org/officeDocument/2006/relationships" xmlns:p="http://schemas.openxmlformats.org/presentationml/2006/main" show="0">
   <p:cSld>
     <p:spTree>
       <p:nvGrpSpPr>
@@ -12525,7 +12636,7 @@
 </file>
 
 <file path=ppt/slides/slide18.xml><?xml version="1.0" encoding="utf-8"?>
-<p:sld xmlns:a="http://schemas.openxmlformats.org/drawingml/2006/main" xmlns:r="http://schemas.openxmlformats.org/officeDocument/2006/relationships" xmlns:p="http://schemas.openxmlformats.org/presentationml/2006/main">
+<p:sld xmlns:a="http://schemas.openxmlformats.org/drawingml/2006/main" xmlns:r="http://schemas.openxmlformats.org/officeDocument/2006/relationships" xmlns:p="http://schemas.openxmlformats.org/presentationml/2006/main" show="0">
   <p:cSld>
     <p:spTree>
       <p:nvGrpSpPr>
@@ -12663,7 +12774,7 @@
           <p:nvPr>
             <p:extLst>
               <p:ext uri="{D42A27DB-BD31-4B8C-83A1-F6EECF244321}">
-                <p14:modId xmlns:p14="http://schemas.microsoft.com/office/powerpoint/2010/main" val="339210222"/>
+                <p14:modId xmlns:p14="http://schemas.microsoft.com/office/powerpoint/2010/main" val="2725145433"/>
               </p:ext>
             </p:extLst>
           </p:nvPr>
@@ -13241,7 +13352,7 @@
 </file>
 
 <file path=ppt/slides/slide19.xml><?xml version="1.0" encoding="utf-8"?>
-<p:sld xmlns:a="http://schemas.openxmlformats.org/drawingml/2006/main" xmlns:r="http://schemas.openxmlformats.org/officeDocument/2006/relationships" xmlns:p="http://schemas.openxmlformats.org/presentationml/2006/main">
+<p:sld xmlns:a="http://schemas.openxmlformats.org/drawingml/2006/main" xmlns:r="http://schemas.openxmlformats.org/officeDocument/2006/relationships" xmlns:p="http://schemas.openxmlformats.org/presentationml/2006/main" show="0">
   <p:cSld>
     <p:spTree>
       <p:nvGrpSpPr>
@@ -13496,12 +13607,611 @@
           <a:chExt cx="0" cy="0"/>
         </a:xfrm>
       </p:grpSpPr>
+      <p:pic>
+        <p:nvPicPr>
+          <p:cNvPr id="4098" name="Picture 2" descr="Foto grátis conceito de negócio com holografia gráfica">
+            <a:extLst>
+              <a:ext uri="{FF2B5EF4-FFF2-40B4-BE49-F238E27FC236}">
+                <a16:creationId xmlns:a16="http://schemas.microsoft.com/office/drawing/2014/main" id="{15DB04EF-B1CC-6032-C6E6-1E51C5553005}"/>
+              </a:ext>
+            </a:extLst>
+          </p:cNvPr>
+          <p:cNvPicPr>
+            <a:picLocks noChangeAspect="1" noChangeArrowheads="1"/>
+          </p:cNvPicPr>
+          <p:nvPr/>
+        </p:nvPicPr>
+        <p:blipFill>
+          <a:blip r:embed="rId2">
+            <a:extLst>
+              <a:ext uri="{28A0092B-C50C-407E-A947-70E740481C1C}">
+                <a14:useLocalDpi xmlns:a14="http://schemas.microsoft.com/office/drawing/2010/main" val="0"/>
+              </a:ext>
+            </a:extLst>
+          </a:blip>
+          <a:srcRect/>
+          <a:stretch>
+            <a:fillRect/>
+          </a:stretch>
+        </p:blipFill>
+        <p:spPr bwMode="auto">
+          <a:xfrm>
+            <a:off x="-86061" y="-75304"/>
+            <a:ext cx="3531625" cy="7024744"/>
+          </a:xfrm>
+          <a:prstGeom prst="rect">
+            <a:avLst/>
+          </a:prstGeom>
+          <a:noFill/>
+          <a:extLst>
+            <a:ext uri="{909E8E84-426E-40DD-AFC4-6F175D3DCCD1}">
+              <a14:hiddenFill xmlns:a14="http://schemas.microsoft.com/office/drawing/2010/main">
+                <a:solidFill>
+                  <a:srgbClr val="FFFFFF"/>
+                </a:solidFill>
+              </a14:hiddenFill>
+            </a:ext>
+          </a:extLst>
+        </p:spPr>
+      </p:pic>
+      <p:sp>
+        <p:nvSpPr>
+          <p:cNvPr id="2" name="Retângulo 1">
+            <a:extLst>
+              <a:ext uri="{FF2B5EF4-FFF2-40B4-BE49-F238E27FC236}">
+                <a16:creationId xmlns:a16="http://schemas.microsoft.com/office/drawing/2014/main" id="{EC529A09-4B2A-4D45-872A-5138856595CA}"/>
+              </a:ext>
+            </a:extLst>
+          </p:cNvPr>
+          <p:cNvSpPr/>
+          <p:nvPr/>
+        </p:nvSpPr>
+        <p:spPr>
+          <a:xfrm>
+            <a:off x="4378385" y="2252838"/>
+            <a:ext cx="6096000" cy="3539430"/>
+          </a:xfrm>
+          <a:prstGeom prst="rect">
+            <a:avLst/>
+          </a:prstGeom>
+        </p:spPr>
+        <p:txBody>
+          <a:bodyPr>
+            <a:spAutoFit/>
+          </a:bodyPr>
+          <a:lstStyle/>
+          <a:p>
+            <a:r>
+              <a:rPr lang="pt-BR" sz="1400" b="1" dirty="0">
+                <a:solidFill>
+                  <a:srgbClr val="434343"/>
+                </a:solidFill>
+                <a:latin typeface="Open Sans" panose="020B0604020202020204" charset="0"/>
+                <a:ea typeface="Open Sans" panose="020B0604020202020204" charset="0"/>
+                <a:cs typeface="Open Sans" panose="020B0604020202020204" charset="0"/>
+              </a:rPr>
+              <a:t>Nome do Aluno:</a:t>
+            </a:r>
+          </a:p>
+          <a:p>
+            <a:r>
+              <a:rPr lang="pt-BR" sz="1200" dirty="0">
+                <a:solidFill>
+                  <a:srgbClr val="434343"/>
+                </a:solidFill>
+                <a:latin typeface="Open Sans" panose="020B0604020202020204" charset="0"/>
+                <a:ea typeface="Open Sans" panose="020B0604020202020204" charset="0"/>
+                <a:cs typeface="Open Sans" panose="020B0604020202020204" charset="0"/>
+              </a:rPr>
+              <a:t>Alexandre Correa Alves</a:t>
+            </a:r>
+          </a:p>
+          <a:p>
+            <a:endParaRPr lang="pt-BR" sz="1400" b="1" dirty="0">
+              <a:solidFill>
+                <a:srgbClr val="434343"/>
+              </a:solidFill>
+              <a:latin typeface="Open Sans" panose="020B0604020202020204" charset="0"/>
+              <a:ea typeface="Open Sans" panose="020B0604020202020204" charset="0"/>
+              <a:cs typeface="Open Sans" panose="020B0604020202020204" charset="0"/>
+            </a:endParaRPr>
+          </a:p>
+          <a:p>
+            <a:endParaRPr lang="pt-BR" sz="1400" b="1" dirty="0">
+              <a:solidFill>
+                <a:srgbClr val="434343"/>
+              </a:solidFill>
+              <a:latin typeface="Open Sans" panose="020B0604020202020204" charset="0"/>
+              <a:ea typeface="Open Sans" panose="020B0604020202020204" charset="0"/>
+              <a:cs typeface="Open Sans" panose="020B0604020202020204" charset="0"/>
+            </a:endParaRPr>
+          </a:p>
+          <a:p>
+            <a:endParaRPr lang="pt-BR" sz="1400" b="1" dirty="0">
+              <a:solidFill>
+                <a:srgbClr val="434343"/>
+              </a:solidFill>
+              <a:latin typeface="Open Sans" panose="020B0604020202020204" charset="0"/>
+              <a:ea typeface="Open Sans" panose="020B0604020202020204" charset="0"/>
+              <a:cs typeface="Open Sans" panose="020B0604020202020204" charset="0"/>
+            </a:endParaRPr>
+          </a:p>
+          <a:p>
+            <a:endParaRPr lang="pt-BR" sz="1400" b="1" dirty="0">
+              <a:solidFill>
+                <a:srgbClr val="434343"/>
+              </a:solidFill>
+              <a:latin typeface="Open Sans" panose="020B0604020202020204" charset="0"/>
+              <a:ea typeface="Open Sans" panose="020B0604020202020204" charset="0"/>
+              <a:cs typeface="Open Sans" panose="020B0604020202020204" charset="0"/>
+            </a:endParaRPr>
+          </a:p>
+          <a:p>
+            <a:endParaRPr lang="pt-BR" sz="1400" b="1" dirty="0">
+              <a:solidFill>
+                <a:srgbClr val="434343"/>
+              </a:solidFill>
+              <a:latin typeface="Open Sans" panose="020B0604020202020204" charset="0"/>
+              <a:ea typeface="Open Sans" panose="020B0604020202020204" charset="0"/>
+              <a:cs typeface="Open Sans" panose="020B0604020202020204" charset="0"/>
+            </a:endParaRPr>
+          </a:p>
+          <a:p>
+            <a:endParaRPr lang="pt-BR" sz="1400" b="1" dirty="0">
+              <a:solidFill>
+                <a:srgbClr val="434343"/>
+              </a:solidFill>
+              <a:latin typeface="Open Sans" panose="020B0604020202020204" charset="0"/>
+              <a:ea typeface="Open Sans" panose="020B0604020202020204" charset="0"/>
+              <a:cs typeface="Open Sans" panose="020B0604020202020204" charset="0"/>
+            </a:endParaRPr>
+          </a:p>
+          <a:p>
+            <a:endParaRPr lang="pt-BR" sz="1400" b="1" dirty="0">
+              <a:solidFill>
+                <a:srgbClr val="434343"/>
+              </a:solidFill>
+              <a:latin typeface="Open Sans" panose="020B0604020202020204" charset="0"/>
+              <a:ea typeface="Open Sans" panose="020B0604020202020204" charset="0"/>
+              <a:cs typeface="Open Sans" panose="020B0604020202020204" charset="0"/>
+            </a:endParaRPr>
+          </a:p>
+          <a:p>
+            <a:endParaRPr lang="pt-BR" sz="1400" b="1" dirty="0">
+              <a:solidFill>
+                <a:srgbClr val="434343"/>
+              </a:solidFill>
+              <a:latin typeface="Open Sans" panose="020B0604020202020204" charset="0"/>
+              <a:ea typeface="Open Sans" panose="020B0604020202020204" charset="0"/>
+              <a:cs typeface="Open Sans" panose="020B0604020202020204" charset="0"/>
+            </a:endParaRPr>
+          </a:p>
+          <a:p>
+            <a:endParaRPr lang="pt-BR" sz="1400" b="1" dirty="0">
+              <a:solidFill>
+                <a:srgbClr val="434343"/>
+              </a:solidFill>
+              <a:latin typeface="Open Sans" panose="020B0604020202020204" charset="0"/>
+              <a:ea typeface="Open Sans" panose="020B0604020202020204" charset="0"/>
+              <a:cs typeface="Open Sans" panose="020B0604020202020204" charset="0"/>
+            </a:endParaRPr>
+          </a:p>
+          <a:p>
+            <a:endParaRPr lang="pt-BR" sz="1400" b="1" dirty="0">
+              <a:solidFill>
+                <a:srgbClr val="434343"/>
+              </a:solidFill>
+              <a:latin typeface="Open Sans" panose="020B0604020202020204" charset="0"/>
+              <a:ea typeface="Open Sans" panose="020B0604020202020204" charset="0"/>
+              <a:cs typeface="Open Sans" panose="020B0604020202020204" charset="0"/>
+            </a:endParaRPr>
+          </a:p>
+          <a:p>
+            <a:endParaRPr lang="pt-BR" sz="1400" dirty="0">
+              <a:solidFill>
+                <a:srgbClr val="434343"/>
+              </a:solidFill>
+              <a:latin typeface="Open Sans" panose="020B0604020202020204" charset="0"/>
+              <a:ea typeface="Open Sans" panose="020B0604020202020204" charset="0"/>
+              <a:cs typeface="Open Sans" panose="020B0604020202020204" charset="0"/>
+            </a:endParaRPr>
+          </a:p>
+          <a:p>
+            <a:r>
+              <a:rPr lang="pt-BR" sz="1400" b="1" dirty="0">
+                <a:solidFill>
+                  <a:srgbClr val="434343"/>
+                </a:solidFill>
+                <a:latin typeface="Open Sans" panose="020B0604020202020204" charset="0"/>
+                <a:ea typeface="Open Sans" panose="020B0604020202020204" charset="0"/>
+                <a:cs typeface="Open Sans" panose="020B0604020202020204" charset="0"/>
+              </a:rPr>
+              <a:t>Coordenadores: </a:t>
+            </a:r>
+          </a:p>
+          <a:p>
+            <a:r>
+              <a:rPr lang="pt-BR" sz="1200" dirty="0">
+                <a:solidFill>
+                  <a:srgbClr val="434343"/>
+                </a:solidFill>
+                <a:latin typeface="Open Sans" panose="020B0604020202020204" charset="0"/>
+                <a:ea typeface="Open Sans" panose="020B0604020202020204" charset="0"/>
+                <a:cs typeface="Open Sans" panose="020B0604020202020204" charset="0"/>
+              </a:rPr>
+              <a:t>Profª Drª Alessandra de Álvila Montini</a:t>
+            </a:r>
+          </a:p>
+          <a:p>
+            <a:r>
+              <a:rPr lang="pt-BR" sz="1200" dirty="0">
+                <a:solidFill>
+                  <a:srgbClr val="434343"/>
+                </a:solidFill>
+                <a:latin typeface="Open Sans" panose="020B0604020202020204" charset="0"/>
+                <a:ea typeface="Open Sans" panose="020B0604020202020204" charset="0"/>
+                <a:cs typeface="Open Sans" panose="020B0604020202020204" charset="0"/>
+              </a:rPr>
+              <a:t>Profª Dr.  </a:t>
+            </a:r>
+            <a:r>
+              <a:rPr lang="pt-BR" sz="1200" dirty="0">
+                <a:solidFill>
+                  <a:srgbClr val="434343"/>
+                </a:solidFill>
+                <a:latin typeface="Open Sans" panose="020B0604020202020204" charset="0"/>
+              </a:rPr>
+              <a:t>Adolpho Walter Pimazoni Canton</a:t>
+            </a:r>
+          </a:p>
+        </p:txBody>
+      </p:sp>
+      <p:sp>
+        <p:nvSpPr>
+          <p:cNvPr id="17" name="Title Placeholder 1">
+            <a:extLst>
+              <a:ext uri="{FF2B5EF4-FFF2-40B4-BE49-F238E27FC236}">
+                <a16:creationId xmlns:a16="http://schemas.microsoft.com/office/drawing/2014/main" id="{3A953594-6680-4823-92E3-9184F1B5A4D3}"/>
+              </a:ext>
+            </a:extLst>
+          </p:cNvPr>
+          <p:cNvSpPr txBox="1">
+            <a:spLocks/>
+          </p:cNvSpPr>
+          <p:nvPr/>
+        </p:nvSpPr>
+        <p:spPr>
+          <a:xfrm>
+            <a:off x="3587464" y="352498"/>
+            <a:ext cx="7677842" cy="713234"/>
+          </a:xfrm>
+          <a:prstGeom prst="rect">
+            <a:avLst/>
+          </a:prstGeom>
+        </p:spPr>
+        <p:txBody>
+          <a:bodyPr vert="horz" lIns="91440" tIns="45720" rIns="91440" bIns="45720" rtlCol="0" anchor="ctr">
+            <a:normAutofit fontScale="85000" lnSpcReduction="10000"/>
+          </a:bodyPr>
+          <a:lstStyle>
+            <a:defPPr>
+              <a:defRPr lang="pt-BR"/>
+            </a:defPPr>
+            <a:lvl1pPr>
+              <a:spcBef>
+                <a:spcPct val="0"/>
+              </a:spcBef>
+              <a:buNone/>
+              <a:defRPr sz="2400">
+                <a:solidFill>
+                  <a:srgbClr val="02BAB1"/>
+                </a:solidFill>
+                <a:latin typeface="Futura Md BT" panose="020B0602020204020303" pitchFamily="34" charset="0"/>
+                <a:ea typeface="+mj-ea"/>
+                <a:cs typeface="+mj-cs"/>
+              </a:defRPr>
+            </a:lvl1pPr>
+          </a:lstStyle>
+          <a:p>
+            <a:r>
+              <a:rPr lang="en-US" dirty="0">
+                <a:solidFill>
+                  <a:srgbClr val="434343"/>
+                </a:solidFill>
+                <a:latin typeface="Open Sans" panose="020B0604020202020204" charset="0"/>
+                <a:ea typeface="Open Sans" panose="020B0604020202020204" charset="0"/>
+                <a:cs typeface="Open Sans" panose="020B0604020202020204" charset="0"/>
+              </a:rPr>
+              <a:t>  MBA Analytics em Big Data - Data Engineering – Data Science</a:t>
+            </a:r>
+          </a:p>
+          <a:p>
+            <a:r>
+              <a:rPr lang="en-US" sz="1100" dirty="0">
+                <a:solidFill>
+                  <a:srgbClr val="6ADBD9"/>
+                </a:solidFill>
+                <a:latin typeface="Open Sans" panose="020B0604020202020204" charset="0"/>
+                <a:ea typeface="Open Sans" panose="020B0604020202020204" charset="0"/>
+                <a:cs typeface="Open Sans" panose="020B0604020202020204" charset="0"/>
+              </a:rPr>
+              <a:t>         </a:t>
+            </a:r>
+            <a:endParaRPr lang="en-US" sz="1100" dirty="0">
+              <a:solidFill>
+                <a:srgbClr val="434343"/>
+              </a:solidFill>
+              <a:latin typeface="Open Sans" panose="020B0604020202020204" charset="0"/>
+              <a:ea typeface="Open Sans" panose="020B0604020202020204" charset="0"/>
+              <a:cs typeface="Open Sans" panose="020B0604020202020204" charset="0"/>
+            </a:endParaRPr>
+          </a:p>
+        </p:txBody>
+      </p:sp>
+    </p:spTree>
+    <p:extLst>
+      <p:ext uri="{BB962C8B-B14F-4D97-AF65-F5344CB8AC3E}">
+        <p14:creationId xmlns:p14="http://schemas.microsoft.com/office/powerpoint/2010/main" val="820987417"/>
+      </p:ext>
+    </p:extLst>
+  </p:cSld>
+  <p:clrMapOvr>
+    <a:masterClrMapping/>
+  </p:clrMapOvr>
+</p:sld>
+</file>
+
+<file path=ppt/slides/slide20.xml><?xml version="1.0" encoding="utf-8"?>
+<p:sld xmlns:a="http://schemas.openxmlformats.org/drawingml/2006/main" xmlns:r="http://schemas.openxmlformats.org/officeDocument/2006/relationships" xmlns:p="http://schemas.openxmlformats.org/presentationml/2006/main">
+  <p:cSld>
+    <p:spTree>
+      <p:nvGrpSpPr>
+        <p:cNvPr id="1" name="Shape 54"/>
+        <p:cNvGrpSpPr/>
+        <p:nvPr/>
+      </p:nvGrpSpPr>
+      <p:grpSpPr>
+        <a:xfrm>
+          <a:off x="0" y="0"/>
+          <a:ext cx="0" cy="0"/>
+          <a:chOff x="0" y="0"/>
+          <a:chExt cx="0" cy="0"/>
+        </a:xfrm>
+      </p:grpSpPr>
+      <p:pic>
+        <p:nvPicPr>
+          <p:cNvPr id="9218" name="Picture 2" descr="Foto grátis rastreamento de pulso gerado digitalmente analisando dados de saúde para crescimento eficiente gerado por ia">
+            <a:extLst>
+              <a:ext uri="{FF2B5EF4-FFF2-40B4-BE49-F238E27FC236}">
+                <a16:creationId xmlns:a16="http://schemas.microsoft.com/office/drawing/2014/main" id="{7C1CFD8F-F6E3-0A29-D69B-157D62337D5B}"/>
+              </a:ext>
+            </a:extLst>
+          </p:cNvPr>
+          <p:cNvPicPr>
+            <a:picLocks noChangeAspect="1" noChangeArrowheads="1"/>
+          </p:cNvPicPr>
+          <p:nvPr/>
+        </p:nvPicPr>
+        <p:blipFill>
+          <a:blip r:embed="rId3">
+            <a:extLst>
+              <a:ext uri="{28A0092B-C50C-407E-A947-70E740481C1C}">
+                <a14:useLocalDpi xmlns:a14="http://schemas.microsoft.com/office/drawing/2010/main" val="0"/>
+              </a:ext>
+            </a:extLst>
+          </a:blip>
+          <a:srcRect/>
+          <a:stretch>
+            <a:fillRect/>
+          </a:stretch>
+        </p:blipFill>
+        <p:spPr bwMode="auto">
+          <a:xfrm>
+            <a:off x="4241799" y="0"/>
+            <a:ext cx="8097221" cy="6885971"/>
+          </a:xfrm>
+          <a:prstGeom prst="rect">
+            <a:avLst/>
+          </a:prstGeom>
+          <a:noFill/>
+          <a:extLst>
+            <a:ext uri="{909E8E84-426E-40DD-AFC4-6F175D3DCCD1}">
+              <a14:hiddenFill xmlns:a14="http://schemas.microsoft.com/office/drawing/2010/main">
+                <a:solidFill>
+                  <a:srgbClr val="FFFFFF"/>
+                </a:solidFill>
+              </a14:hiddenFill>
+            </a:ext>
+          </a:extLst>
+        </p:spPr>
+      </p:pic>
       <p:grpSp>
         <p:nvGrpSpPr>
-          <p:cNvPr id="19" name="Agrupar 18">
+          <p:cNvPr id="56" name="Google Shape;56;p13"/>
+          <p:cNvGrpSpPr/>
+          <p:nvPr/>
+        </p:nvGrpSpPr>
+        <p:grpSpPr>
+          <a:xfrm>
+            <a:off x="-3251199" y="-304800"/>
+            <a:ext cx="10893700" cy="7467600"/>
+            <a:chOff x="-2438400" y="-228600"/>
+            <a:chExt cx="8170275" cy="5600700"/>
+          </a:xfrm>
+        </p:grpSpPr>
+        <p:grpSp>
+          <p:nvGrpSpPr>
+            <p:cNvPr id="57" name="Google Shape;57;p13"/>
+            <p:cNvGrpSpPr/>
+            <p:nvPr/>
+          </p:nvGrpSpPr>
+          <p:grpSpPr>
+            <a:xfrm>
+              <a:off x="-2438400" y="0"/>
+              <a:ext cx="8017875" cy="5372100"/>
+              <a:chOff x="-2438400" y="0"/>
+              <a:chExt cx="8017875" cy="5372100"/>
+            </a:xfrm>
+          </p:grpSpPr>
+          <p:pic>
+            <p:nvPicPr>
+              <p:cNvPr id="58" name="Google Shape;58;p13"/>
+              <p:cNvPicPr preferRelativeResize="0"/>
+              <p:nvPr/>
+            </p:nvPicPr>
+            <p:blipFill rotWithShape="1">
+              <a:blip r:embed="rId4">
+                <a:alphaModFix/>
+              </a:blip>
+              <a:srcRect l="-43947"/>
+              <a:stretch/>
+            </p:blipFill>
+            <p:spPr>
+              <a:xfrm rot="10800000" flipH="1">
+                <a:off x="-2438400" y="0"/>
+                <a:ext cx="7987800" cy="5143500"/>
+              </a:xfrm>
+              <a:prstGeom prst="trapezoid">
+                <a:avLst>
+                  <a:gd name="adj" fmla="val 41313"/>
+                </a:avLst>
+              </a:prstGeom>
+              <a:noFill/>
+              <a:ln>
+                <a:noFill/>
+              </a:ln>
+            </p:spPr>
+          </p:pic>
+          <p:cxnSp>
+            <p:nvCxnSpPr>
+              <p:cNvPr id="59" name="Google Shape;59;p13"/>
+              <p:cNvCxnSpPr/>
+              <p:nvPr/>
+            </p:nvCxnSpPr>
+            <p:spPr>
+              <a:xfrm flipH="1">
+                <a:off x="3371775" y="0"/>
+                <a:ext cx="2207700" cy="5372100"/>
+              </a:xfrm>
+              <a:prstGeom prst="straightConnector1">
+                <a:avLst/>
+              </a:prstGeom>
+              <a:noFill/>
+              <a:ln w="28575" cap="flat" cmpd="sng">
+                <a:solidFill>
+                  <a:srgbClr val="6ADBD9"/>
+                </a:solidFill>
+                <a:prstDash val="solid"/>
+                <a:round/>
+                <a:headEnd type="none" w="med" len="med"/>
+                <a:tailEnd type="none" w="med" len="med"/>
+              </a:ln>
+            </p:spPr>
+          </p:cxnSp>
+        </p:grpSp>
+        <p:cxnSp>
+          <p:nvCxnSpPr>
+            <p:cNvPr id="60" name="Google Shape;60;p13"/>
+            <p:cNvCxnSpPr/>
+            <p:nvPr/>
+          </p:nvCxnSpPr>
+          <p:spPr>
+            <a:xfrm flipH="1">
+              <a:off x="3524175" y="-228600"/>
+              <a:ext cx="2207700" cy="5372100"/>
+            </a:xfrm>
+            <a:prstGeom prst="straightConnector1">
+              <a:avLst/>
+            </a:prstGeom>
+            <a:noFill/>
+            <a:ln w="19050" cap="flat" cmpd="sng">
+              <a:solidFill>
+                <a:srgbClr val="6ADBD9"/>
+              </a:solidFill>
+              <a:prstDash val="solid"/>
+              <a:round/>
+              <a:headEnd type="none" w="med" len="med"/>
+              <a:tailEnd type="none" w="med" len="med"/>
+            </a:ln>
+          </p:spPr>
+        </p:cxnSp>
+      </p:grpSp>
+      <p:sp>
+        <p:nvSpPr>
+          <p:cNvPr id="64" name="Google Shape;64;p13"/>
+          <p:cNvSpPr txBox="1"/>
+          <p:nvPr/>
+        </p:nvSpPr>
+        <p:spPr>
+          <a:xfrm>
+            <a:off x="266501" y="5078257"/>
+            <a:ext cx="4330800" cy="508000"/>
+          </a:xfrm>
+          <a:prstGeom prst="rect">
+            <a:avLst/>
+          </a:prstGeom>
+          <a:noFill/>
+          <a:ln>
+            <a:noFill/>
+          </a:ln>
+        </p:spPr>
+        <p:txBody>
+          <a:bodyPr spcFirstLastPara="1" wrap="square" lIns="121900" tIns="121900" rIns="121900" bIns="121900" anchor="t" anchorCtr="0">
+            <a:noAutofit/>
+          </a:bodyPr>
+          <a:lstStyle/>
+          <a:p>
+            <a:pPr defTabSz="1219170">
+              <a:buClr>
+                <a:srgbClr val="000000"/>
+              </a:buClr>
+            </a:pPr>
+            <a:endParaRPr lang="pt-BR" sz="1200" kern="0" dirty="0">
+              <a:solidFill>
+                <a:schemeClr val="bg1"/>
+              </a:solidFill>
+              <a:latin typeface="Open Sans"/>
+              <a:ea typeface="Open Sans"/>
+              <a:cs typeface="Open Sans"/>
+              <a:sym typeface="Open Sans"/>
+            </a:endParaRPr>
+          </a:p>
+          <a:p>
+            <a:pPr defTabSz="1219170">
+              <a:buClr>
+                <a:srgbClr val="000000"/>
+              </a:buClr>
+            </a:pPr>
+            <a:r>
+              <a:rPr lang="pt-BR" sz="1200" kern="0" dirty="0">
+                <a:solidFill>
+                  <a:schemeClr val="bg1"/>
+                </a:solidFill>
+                <a:latin typeface="Open Sans"/>
+                <a:ea typeface="Open Sans"/>
+                <a:cs typeface="Open Sans"/>
+                <a:sym typeface="Open Sans"/>
+              </a:rPr>
+              <a:t>13/11/2023</a:t>
+            </a:r>
+            <a:endParaRPr kern="0" dirty="0">
+              <a:solidFill>
+                <a:schemeClr val="bg1"/>
+              </a:solidFill>
+              <a:latin typeface="Open Sans"/>
+              <a:ea typeface="Open Sans"/>
+              <a:cs typeface="Open Sans"/>
+              <a:sym typeface="Open Sans"/>
+            </a:endParaRPr>
+          </a:p>
+        </p:txBody>
+      </p:sp>
+      <p:grpSp>
+        <p:nvGrpSpPr>
+          <p:cNvPr id="16" name="Agrupar 15">
             <a:extLst>
               <a:ext uri="{FF2B5EF4-FFF2-40B4-BE49-F238E27FC236}">
-                <a16:creationId xmlns:a16="http://schemas.microsoft.com/office/drawing/2014/main" id="{1E52F81F-9F55-4259-9DEC-E6D2D3869AFA}"/>
+                <a16:creationId xmlns:a16="http://schemas.microsoft.com/office/drawing/2014/main" id="{9684D99A-72DF-4D5F-8D9A-5736DBDA7732}"/>
               </a:ext>
             </a:extLst>
           </p:cNvPr>
@@ -13510,18 +14220,18 @@
         </p:nvGrpSpPr>
         <p:grpSpPr>
           <a:xfrm>
-            <a:off x="1" y="0"/>
-            <a:ext cx="3445564" cy="6858000"/>
-            <a:chOff x="8497038" y="155404"/>
-            <a:chExt cx="2827606" cy="2308431"/>
+            <a:off x="0" y="27970"/>
+            <a:ext cx="5282118" cy="5143500"/>
+            <a:chOff x="4063978" y="94597"/>
+            <a:chExt cx="2977228" cy="2308431"/>
           </a:xfrm>
         </p:grpSpPr>
         <p:sp>
           <p:nvSpPr>
-            <p:cNvPr id="20" name="Retângulo 19">
+            <p:cNvPr id="17" name="Retângulo 16">
               <a:extLst>
                 <a:ext uri="{FF2B5EF4-FFF2-40B4-BE49-F238E27FC236}">
-                  <a16:creationId xmlns:a16="http://schemas.microsoft.com/office/drawing/2014/main" id="{1DB0423B-BFE5-4688-99FE-3B88479CBC4F}"/>
+                  <a16:creationId xmlns:a16="http://schemas.microsoft.com/office/drawing/2014/main" id="{AE5BFAF2-8E54-436D-B6EE-98DEE8DABB4E}"/>
                 </a:ext>
               </a:extLst>
             </p:cNvPr>
@@ -13529,29 +14239,16 @@
             <p:nvPr/>
           </p:nvSpPr>
           <p:spPr>
-            <a:xfrm>
-              <a:off x="8497038" y="155404"/>
-              <a:ext cx="2827606" cy="2308431"/>
+            <a:xfrm rot="10800000">
+              <a:off x="4063978" y="94597"/>
+              <a:ext cx="2977228" cy="2308431"/>
             </a:xfrm>
             <a:prstGeom prst="rect">
               <a:avLst/>
             </a:prstGeom>
-            <a:gradFill>
-              <a:gsLst>
-                <a:gs pos="0">
-                  <a:srgbClr val="6ADBD9"/>
-                </a:gs>
-                <a:gs pos="50000">
-                  <a:srgbClr val="6ADBD9"/>
-                </a:gs>
-                <a:gs pos="100000">
-                  <a:srgbClr val="66CCFF"/>
-                </a:gs>
-              </a:gsLst>
-              <a:path path="circle">
-                <a:fillToRect l="100000" t="100000"/>
-              </a:path>
-            </a:gradFill>
+            <a:solidFill>
+              <a:srgbClr val="6ADBD9"/>
+            </a:solidFill>
             <a:ln>
               <a:noFill/>
             </a:ln>
@@ -13583,10 +14280,10 @@
         </p:sp>
         <p:pic>
           <p:nvPicPr>
-            <p:cNvPr id="21" name="Google Shape;62;p13">
+            <p:cNvPr id="18" name="Google Shape;62;p13">
               <a:extLst>
                 <a:ext uri="{FF2B5EF4-FFF2-40B4-BE49-F238E27FC236}">
-                  <a16:creationId xmlns:a16="http://schemas.microsoft.com/office/drawing/2014/main" id="{C10E9FA6-1979-4D41-A34F-80E912CFA0EB}"/>
+                  <a16:creationId xmlns:a16="http://schemas.microsoft.com/office/drawing/2014/main" id="{64E7C09F-0341-482E-BCB1-79FB64B2AB76}"/>
                 </a:ext>
               </a:extLst>
             </p:cNvPr>
@@ -13594,7 +14291,7 @@
             <p:nvPr/>
           </p:nvPicPr>
           <p:blipFill>
-            <a:blip r:embed="rId2">
+            <a:blip r:embed="rId5">
               <a:alphaModFix/>
             </a:blip>
             <a:stretch>
@@ -13602,9 +14299,9 @@
             </a:stretch>
           </p:blipFill>
           <p:spPr>
-            <a:xfrm flipH="1">
-              <a:off x="9387797" y="1853141"/>
-              <a:ext cx="1936847" cy="610694"/>
+            <a:xfrm rot="10800000" flipH="1">
+              <a:off x="4126949" y="96004"/>
+              <a:ext cx="2027620" cy="1407280"/>
             </a:xfrm>
             <a:prstGeom prst="rect">
               <a:avLst/>
@@ -13618,222 +14315,10 @@
       </p:grpSp>
       <p:sp>
         <p:nvSpPr>
-          <p:cNvPr id="2" name="Retângulo 1">
+          <p:cNvPr id="12" name="Title Placeholder 1">
             <a:extLst>
               <a:ext uri="{FF2B5EF4-FFF2-40B4-BE49-F238E27FC236}">
-                <a16:creationId xmlns:a16="http://schemas.microsoft.com/office/drawing/2014/main" id="{EC529A09-4B2A-4D45-872A-5138856595CA}"/>
-              </a:ext>
-            </a:extLst>
-          </p:cNvPr>
-          <p:cNvSpPr/>
-          <p:nvPr/>
-        </p:nvSpPr>
-        <p:spPr>
-          <a:xfrm>
-            <a:off x="4378385" y="2252838"/>
-            <a:ext cx="6096000" cy="3539430"/>
-          </a:xfrm>
-          <a:prstGeom prst="rect">
-            <a:avLst/>
-          </a:prstGeom>
-        </p:spPr>
-        <p:txBody>
-          <a:bodyPr>
-            <a:spAutoFit/>
-          </a:bodyPr>
-          <a:lstStyle/>
-          <a:p>
-            <a:r>
-              <a:rPr lang="pt-BR" sz="1400" b="1" dirty="0">
-                <a:solidFill>
-                  <a:srgbClr val="434343"/>
-                </a:solidFill>
-                <a:latin typeface="Open Sans" panose="020B0604020202020204" charset="0"/>
-                <a:ea typeface="Open Sans" panose="020B0604020202020204" charset="0"/>
-                <a:cs typeface="Open Sans" panose="020B0604020202020204" charset="0"/>
-              </a:rPr>
-              <a:t>Nome do Aluno:</a:t>
-            </a:r>
-          </a:p>
-          <a:p>
-            <a:r>
-              <a:rPr lang="pt-BR" sz="1200" dirty="0">
-                <a:solidFill>
-                  <a:srgbClr val="434343"/>
-                </a:solidFill>
-                <a:latin typeface="Open Sans" panose="020B0604020202020204" charset="0"/>
-                <a:ea typeface="Open Sans" panose="020B0604020202020204" charset="0"/>
-                <a:cs typeface="Open Sans" panose="020B0604020202020204" charset="0"/>
-              </a:rPr>
-              <a:t>Alexandre Correa Alves</a:t>
-            </a:r>
-          </a:p>
-          <a:p>
-            <a:endParaRPr lang="pt-BR" sz="1400" b="1" dirty="0">
-              <a:solidFill>
-                <a:srgbClr val="434343"/>
-              </a:solidFill>
-              <a:latin typeface="Open Sans" panose="020B0604020202020204" charset="0"/>
-              <a:ea typeface="Open Sans" panose="020B0604020202020204" charset="0"/>
-              <a:cs typeface="Open Sans" panose="020B0604020202020204" charset="0"/>
-            </a:endParaRPr>
-          </a:p>
-          <a:p>
-            <a:endParaRPr lang="pt-BR" sz="1400" b="1" dirty="0">
-              <a:solidFill>
-                <a:srgbClr val="434343"/>
-              </a:solidFill>
-              <a:latin typeface="Open Sans" panose="020B0604020202020204" charset="0"/>
-              <a:ea typeface="Open Sans" panose="020B0604020202020204" charset="0"/>
-              <a:cs typeface="Open Sans" panose="020B0604020202020204" charset="0"/>
-            </a:endParaRPr>
-          </a:p>
-          <a:p>
-            <a:endParaRPr lang="pt-BR" sz="1400" b="1" dirty="0">
-              <a:solidFill>
-                <a:srgbClr val="434343"/>
-              </a:solidFill>
-              <a:latin typeface="Open Sans" panose="020B0604020202020204" charset="0"/>
-              <a:ea typeface="Open Sans" panose="020B0604020202020204" charset="0"/>
-              <a:cs typeface="Open Sans" panose="020B0604020202020204" charset="0"/>
-            </a:endParaRPr>
-          </a:p>
-          <a:p>
-            <a:endParaRPr lang="pt-BR" sz="1400" b="1" dirty="0">
-              <a:solidFill>
-                <a:srgbClr val="434343"/>
-              </a:solidFill>
-              <a:latin typeface="Open Sans" panose="020B0604020202020204" charset="0"/>
-              <a:ea typeface="Open Sans" panose="020B0604020202020204" charset="0"/>
-              <a:cs typeface="Open Sans" panose="020B0604020202020204" charset="0"/>
-            </a:endParaRPr>
-          </a:p>
-          <a:p>
-            <a:endParaRPr lang="pt-BR" sz="1400" b="1" dirty="0">
-              <a:solidFill>
-                <a:srgbClr val="434343"/>
-              </a:solidFill>
-              <a:latin typeface="Open Sans" panose="020B0604020202020204" charset="0"/>
-              <a:ea typeface="Open Sans" panose="020B0604020202020204" charset="0"/>
-              <a:cs typeface="Open Sans" panose="020B0604020202020204" charset="0"/>
-            </a:endParaRPr>
-          </a:p>
-          <a:p>
-            <a:endParaRPr lang="pt-BR" sz="1400" b="1" dirty="0">
-              <a:solidFill>
-                <a:srgbClr val="434343"/>
-              </a:solidFill>
-              <a:latin typeface="Open Sans" panose="020B0604020202020204" charset="0"/>
-              <a:ea typeface="Open Sans" panose="020B0604020202020204" charset="0"/>
-              <a:cs typeface="Open Sans" panose="020B0604020202020204" charset="0"/>
-            </a:endParaRPr>
-          </a:p>
-          <a:p>
-            <a:endParaRPr lang="pt-BR" sz="1400" b="1" dirty="0">
-              <a:solidFill>
-                <a:srgbClr val="434343"/>
-              </a:solidFill>
-              <a:latin typeface="Open Sans" panose="020B0604020202020204" charset="0"/>
-              <a:ea typeface="Open Sans" panose="020B0604020202020204" charset="0"/>
-              <a:cs typeface="Open Sans" panose="020B0604020202020204" charset="0"/>
-            </a:endParaRPr>
-          </a:p>
-          <a:p>
-            <a:endParaRPr lang="pt-BR" sz="1400" b="1" dirty="0">
-              <a:solidFill>
-                <a:srgbClr val="434343"/>
-              </a:solidFill>
-              <a:latin typeface="Open Sans" panose="020B0604020202020204" charset="0"/>
-              <a:ea typeface="Open Sans" panose="020B0604020202020204" charset="0"/>
-              <a:cs typeface="Open Sans" panose="020B0604020202020204" charset="0"/>
-            </a:endParaRPr>
-          </a:p>
-          <a:p>
-            <a:endParaRPr lang="pt-BR" sz="1400" b="1" dirty="0">
-              <a:solidFill>
-                <a:srgbClr val="434343"/>
-              </a:solidFill>
-              <a:latin typeface="Open Sans" panose="020B0604020202020204" charset="0"/>
-              <a:ea typeface="Open Sans" panose="020B0604020202020204" charset="0"/>
-              <a:cs typeface="Open Sans" panose="020B0604020202020204" charset="0"/>
-            </a:endParaRPr>
-          </a:p>
-          <a:p>
-            <a:endParaRPr lang="pt-BR" sz="1400" b="1" dirty="0">
-              <a:solidFill>
-                <a:srgbClr val="434343"/>
-              </a:solidFill>
-              <a:latin typeface="Open Sans" panose="020B0604020202020204" charset="0"/>
-              <a:ea typeface="Open Sans" panose="020B0604020202020204" charset="0"/>
-              <a:cs typeface="Open Sans" panose="020B0604020202020204" charset="0"/>
-            </a:endParaRPr>
-          </a:p>
-          <a:p>
-            <a:endParaRPr lang="pt-BR" sz="1400" dirty="0">
-              <a:solidFill>
-                <a:srgbClr val="434343"/>
-              </a:solidFill>
-              <a:latin typeface="Open Sans" panose="020B0604020202020204" charset="0"/>
-              <a:ea typeface="Open Sans" panose="020B0604020202020204" charset="0"/>
-              <a:cs typeface="Open Sans" panose="020B0604020202020204" charset="0"/>
-            </a:endParaRPr>
-          </a:p>
-          <a:p>
-            <a:r>
-              <a:rPr lang="pt-BR" sz="1400" b="1" dirty="0">
-                <a:solidFill>
-                  <a:srgbClr val="434343"/>
-                </a:solidFill>
-                <a:latin typeface="Open Sans" panose="020B0604020202020204" charset="0"/>
-                <a:ea typeface="Open Sans" panose="020B0604020202020204" charset="0"/>
-                <a:cs typeface="Open Sans" panose="020B0604020202020204" charset="0"/>
-              </a:rPr>
-              <a:t>Coordenadores: </a:t>
-            </a:r>
-          </a:p>
-          <a:p>
-            <a:r>
-              <a:rPr lang="pt-BR" sz="1200" dirty="0">
-                <a:solidFill>
-                  <a:srgbClr val="434343"/>
-                </a:solidFill>
-                <a:latin typeface="Open Sans" panose="020B0604020202020204" charset="0"/>
-                <a:ea typeface="Open Sans" panose="020B0604020202020204" charset="0"/>
-                <a:cs typeface="Open Sans" panose="020B0604020202020204" charset="0"/>
-              </a:rPr>
-              <a:t>Profª Drª Alessandra de Álvila Montini</a:t>
-            </a:r>
-          </a:p>
-          <a:p>
-            <a:r>
-              <a:rPr lang="pt-BR" sz="1200" dirty="0">
-                <a:solidFill>
-                  <a:srgbClr val="434343"/>
-                </a:solidFill>
-                <a:latin typeface="Open Sans" panose="020B0604020202020204" charset="0"/>
-                <a:ea typeface="Open Sans" panose="020B0604020202020204" charset="0"/>
-                <a:cs typeface="Open Sans" panose="020B0604020202020204" charset="0"/>
-              </a:rPr>
-              <a:t>Profª Dr.  </a:t>
-            </a:r>
-            <a:r>
-              <a:rPr lang="pt-BR" sz="1200" dirty="0">
-                <a:solidFill>
-                  <a:srgbClr val="434343"/>
-                </a:solidFill>
-                <a:latin typeface="Open Sans" panose="020B0604020202020204" charset="0"/>
-              </a:rPr>
-              <a:t>Adolpho Walter Pimazoni Canton</a:t>
-            </a:r>
-          </a:p>
-        </p:txBody>
-      </p:sp>
-      <p:sp>
-        <p:nvSpPr>
-          <p:cNvPr id="17" name="Title Placeholder 1">
-            <a:extLst>
-              <a:ext uri="{FF2B5EF4-FFF2-40B4-BE49-F238E27FC236}">
-                <a16:creationId xmlns:a16="http://schemas.microsoft.com/office/drawing/2014/main" id="{3A953594-6680-4823-92E3-9184F1B5A4D3}"/>
+                <a16:creationId xmlns:a16="http://schemas.microsoft.com/office/drawing/2014/main" id="{07F0ED33-AD32-4C33-85BB-32CDD38A7B6A}"/>
               </a:ext>
             </a:extLst>
           </p:cNvPr>
@@ -13844,7 +14329,150 @@
         </p:nvSpPr>
         <p:spPr>
           <a:xfrm>
-            <a:off x="3982171" y="502979"/>
+            <a:off x="-10023" y="3107738"/>
+            <a:ext cx="6312544" cy="892512"/>
+          </a:xfrm>
+          <a:prstGeom prst="rect">
+            <a:avLst/>
+          </a:prstGeom>
+          <a:noFill/>
+          <a:ln>
+            <a:noFill/>
+          </a:ln>
+        </p:spPr>
+        <p:txBody>
+          <a:bodyPr spcFirstLastPara="1" wrap="square" lIns="91425" tIns="45700" rIns="91425" bIns="45700" anchor="t" anchorCtr="0">
+            <a:spAutoFit/>
+          </a:bodyPr>
+          <a:lstStyle>
+            <a:defPPr>
+              <a:defRPr lang="pt-BR"/>
+            </a:defPPr>
+            <a:lvl1pPr marR="0" lvl="0" indent="0">
+              <a:spcBef>
+                <a:spcPts val="0"/>
+              </a:spcBef>
+              <a:spcAft>
+                <a:spcPts val="0"/>
+              </a:spcAft>
+              <a:buNone/>
+              <a:defRPr sz="3600" b="1" i="0" u="none" strike="noStrike" cap="none">
+                <a:solidFill>
+                  <a:srgbClr val="191919"/>
+                </a:solidFill>
+                <a:latin typeface="Open Sans"/>
+                <a:ea typeface="Open Sans"/>
+                <a:cs typeface="Open Sans"/>
+              </a:defRPr>
+            </a:lvl1pPr>
+          </a:lstStyle>
+          <a:p>
+            <a:r>
+              <a:rPr lang="da-DK" dirty="0">
+                <a:solidFill>
+                  <a:schemeClr val="tx1"/>
+                </a:solidFill>
+              </a:rPr>
+              <a:t>Análise Exploratória (EDA)</a:t>
+            </a:r>
+            <a:endParaRPr lang="da-DK" dirty="0">
+              <a:solidFill>
+                <a:schemeClr val="bg1"/>
+              </a:solidFill>
+            </a:endParaRPr>
+          </a:p>
+          <a:p>
+            <a:r>
+              <a:rPr lang="da-DK" sz="1600" dirty="0">
+                <a:solidFill>
+                  <a:schemeClr val="bg1"/>
+                </a:solidFill>
+              </a:rPr>
+              <a:t>O que os dados nos conta?</a:t>
+            </a:r>
+          </a:p>
+        </p:txBody>
+      </p:sp>
+      <p:pic>
+        <p:nvPicPr>
+          <p:cNvPr id="21" name="Google Shape;91;p2">
+            <a:extLst>
+              <a:ext uri="{FF2B5EF4-FFF2-40B4-BE49-F238E27FC236}">
+                <a16:creationId xmlns:a16="http://schemas.microsoft.com/office/drawing/2014/main" id="{EBC00D96-CC2E-DCAF-7F84-8EA4D40204A2}"/>
+              </a:ext>
+            </a:extLst>
+          </p:cNvPr>
+          <p:cNvPicPr preferRelativeResize="0"/>
+          <p:nvPr/>
+        </p:nvPicPr>
+        <p:blipFill rotWithShape="1">
+          <a:blip r:embed="rId6">
+            <a:alphaModFix/>
+          </a:blip>
+          <a:srcRect l="4556" t="15824" r="3673" b="14354"/>
+          <a:stretch/>
+        </p:blipFill>
+        <p:spPr>
+          <a:xfrm>
+            <a:off x="362034" y="6321878"/>
+            <a:ext cx="2582838" cy="529716"/>
+          </a:xfrm>
+          <a:prstGeom prst="rect">
+            <a:avLst/>
+          </a:prstGeom>
+          <a:noFill/>
+          <a:ln>
+            <a:noFill/>
+          </a:ln>
+        </p:spPr>
+      </p:pic>
+    </p:spTree>
+    <p:extLst>
+      <p:ext uri="{BB962C8B-B14F-4D97-AF65-F5344CB8AC3E}">
+        <p14:creationId xmlns:p14="http://schemas.microsoft.com/office/powerpoint/2010/main" val="3862467588"/>
+      </p:ext>
+    </p:extLst>
+  </p:cSld>
+  <p:clrMapOvr>
+    <a:masterClrMapping/>
+  </p:clrMapOvr>
+</p:sld>
+</file>
+
+<file path=ppt/slides/slide21.xml><?xml version="1.0" encoding="utf-8"?>
+<p:sld xmlns:a="http://schemas.openxmlformats.org/drawingml/2006/main" xmlns:r="http://schemas.openxmlformats.org/officeDocument/2006/relationships" xmlns:p="http://schemas.openxmlformats.org/presentationml/2006/main">
+  <p:cSld>
+    <p:spTree>
+      <p:nvGrpSpPr>
+        <p:cNvPr id="1" name=""/>
+        <p:cNvGrpSpPr/>
+        <p:nvPr/>
+      </p:nvGrpSpPr>
+      <p:grpSpPr>
+        <a:xfrm>
+          <a:off x="0" y="0"/>
+          <a:ext cx="0" cy="0"/>
+          <a:chOff x="0" y="0"/>
+          <a:chExt cx="0" cy="0"/>
+        </a:xfrm>
+      </p:grpSpPr>
+      <p:sp>
+        <p:nvSpPr>
+          <p:cNvPr id="17" name="Title Placeholder 1">
+            <a:extLst>
+              <a:ext uri="{FF2B5EF4-FFF2-40B4-BE49-F238E27FC236}">
+                <a16:creationId xmlns:a16="http://schemas.microsoft.com/office/drawing/2014/main" id="{3594DE52-7C66-4B4A-A0A2-6A19C13FEDE7}"/>
+              </a:ext>
+            </a:extLst>
+          </p:cNvPr>
+          <p:cNvSpPr txBox="1">
+            <a:spLocks/>
+          </p:cNvSpPr>
+          <p:nvPr/>
+        </p:nvSpPr>
+        <p:spPr>
+          <a:xfrm>
+            <a:off x="176514" y="112935"/>
             <a:ext cx="6624736" cy="713234"/>
           </a:xfrm>
           <a:prstGeom prst="rect">
@@ -13853,7 +14481,7 @@
         </p:spPr>
         <p:txBody>
           <a:bodyPr vert="horz" lIns="91440" tIns="45720" rIns="91440" bIns="45720" rtlCol="0" anchor="ctr">
-            <a:normAutofit fontScale="92500"/>
+            <a:normAutofit fontScale="40000" lnSpcReduction="20000"/>
           </a:bodyPr>
           <a:lstStyle>
             <a:defPPr>
@@ -13875,94 +14503,437 @@
             </a:lvl1pPr>
           </a:lstStyle>
           <a:p>
-            <a:r>
-              <a:rPr lang="en-US" dirty="0">
+            <a:pPr marL="0" marR="0" lvl="0" indent="0" algn="l" defTabSz="914400" rtl="0" eaLnBrk="1" fontAlgn="auto" latinLnBrk="0" hangingPunct="1">
+              <a:lnSpc>
+                <a:spcPct val="100000"/>
+              </a:lnSpc>
+              <a:spcBef>
+                <a:spcPct val="0"/>
+              </a:spcBef>
+              <a:spcAft>
+                <a:spcPts val="0"/>
+              </a:spcAft>
+              <a:buClrTx/>
+              <a:buSzTx/>
+              <a:buFontTx/>
+              <a:buNone/>
+              <a:tabLst/>
+              <a:defRPr/>
+            </a:pPr>
+            <a:r>
+              <a:rPr kumimoji="0" lang="en-US" sz="5100" b="0" i="0" u="none" strike="noStrike" kern="1200" cap="none" spc="0" normalizeH="0" baseline="0" noProof="0" dirty="0">
+                <a:ln>
+                  <a:noFill/>
+                </a:ln>
                 <a:solidFill>
                   <a:srgbClr val="434343"/>
                 </a:solidFill>
+                <a:effectLst/>
+                <a:uLnTx/>
+                <a:uFillTx/>
                 <a:latin typeface="Open Sans" panose="020B0604020202020204" charset="0"/>
                 <a:ea typeface="Open Sans" panose="020B0604020202020204" charset="0"/>
                 <a:cs typeface="Open Sans" panose="020B0604020202020204" charset="0"/>
               </a:rPr>
-              <a:t>  MBA Analytics em Big Data - Data Engineering</a:t>
-            </a:r>
-          </a:p>
-          <a:p>
-            <a:r>
-              <a:rPr lang="en-US" sz="1100" dirty="0">
-                <a:solidFill>
-                  <a:srgbClr val="6ADBD9"/>
+              <a:t>    </a:t>
+            </a:r>
+            <a:r>
+              <a:rPr lang="en-US" sz="6000" dirty="0">
+                <a:solidFill>
+                  <a:srgbClr val="434343"/>
                 </a:solidFill>
                 <a:latin typeface="Open Sans" panose="020B0604020202020204" charset="0"/>
                 <a:ea typeface="Open Sans" panose="020B0604020202020204" charset="0"/>
                 <a:cs typeface="Open Sans" panose="020B0604020202020204" charset="0"/>
               </a:rPr>
-              <a:t>         </a:t>
-            </a:r>
-            <a:endParaRPr lang="en-US" sz="1100" dirty="0">
+              <a:t>4</a:t>
+            </a:r>
+            <a:r>
+              <a:rPr kumimoji="0" lang="en-US" sz="6000" b="0" i="0" u="none" strike="noStrike" kern="1200" cap="none" spc="0" normalizeH="0" baseline="0" noProof="0" dirty="0">
+                <a:ln>
+                  <a:noFill/>
+                </a:ln>
+                <a:solidFill>
+                  <a:srgbClr val="434343"/>
+                </a:solidFill>
+                <a:effectLst/>
+                <a:uLnTx/>
+                <a:uFillTx/>
+                <a:latin typeface="Open Sans" panose="020B0604020202020204" charset="0"/>
+                <a:ea typeface="Open Sans" panose="020B0604020202020204" charset="0"/>
+                <a:cs typeface="Open Sans" panose="020B0604020202020204" charset="0"/>
+              </a:rPr>
+              <a:t>.</a:t>
+            </a:r>
+            <a:r>
+              <a:rPr kumimoji="0" lang="en-US" sz="6000" b="0" i="0" u="none" strike="noStrike" kern="1200" cap="none" spc="0" normalizeH="0" baseline="0" noProof="0" dirty="0" err="1">
+                <a:ln>
+                  <a:noFill/>
+                </a:ln>
+                <a:solidFill>
+                  <a:srgbClr val="434343"/>
+                </a:solidFill>
+                <a:effectLst/>
+                <a:uLnTx/>
+                <a:uFillTx/>
+                <a:latin typeface="Open Sans" panose="020B0604020202020204" charset="0"/>
+                <a:ea typeface="Open Sans" panose="020B0604020202020204" charset="0"/>
+                <a:cs typeface="Open Sans" panose="020B0604020202020204" charset="0"/>
+              </a:rPr>
+              <a:t>i</a:t>
+            </a:r>
+            <a:r>
+              <a:rPr kumimoji="0" lang="en-US" sz="6000" b="0" i="0" u="none" strike="noStrike" kern="1200" cap="none" spc="0" normalizeH="0" baseline="0" noProof="0" dirty="0">
+                <a:ln>
+                  <a:noFill/>
+                </a:ln>
+                <a:solidFill>
+                  <a:srgbClr val="434343"/>
+                </a:solidFill>
+                <a:effectLst/>
+                <a:uLnTx/>
+                <a:uFillTx/>
+                <a:latin typeface="Open Sans" panose="020B0604020202020204" charset="0"/>
+                <a:ea typeface="Open Sans" panose="020B0604020202020204" charset="0"/>
+                <a:cs typeface="Open Sans" panose="020B0604020202020204" charset="0"/>
+              </a:rPr>
+              <a:t>. Filtros </a:t>
+            </a:r>
+            <a:r>
+              <a:rPr lang="en-US" sz="6000" dirty="0">
+                <a:solidFill>
+                  <a:srgbClr val="434343"/>
+                </a:solidFill>
+                <a:latin typeface="Open Sans" panose="020B0604020202020204" charset="0"/>
+                <a:ea typeface="Open Sans" panose="020B0604020202020204" charset="0"/>
+                <a:cs typeface="Open Sans" panose="020B0604020202020204" charset="0"/>
+              </a:rPr>
+              <a:t>– Dados Fundamentalistas</a:t>
+            </a:r>
+          </a:p>
+          <a:p>
+            <a:pPr>
+              <a:defRPr/>
+            </a:pPr>
+            <a:r>
+              <a:rPr lang="en-US" sz="2400" dirty="0">
+                <a:solidFill>
+                  <a:srgbClr val="6ADBD9"/>
+                </a:solidFill>
+                <a:latin typeface="Open Sans" panose="020B0604020202020204" charset="0"/>
+                <a:ea typeface="Open Sans" panose="020B0604020202020204" charset="0"/>
+                <a:cs typeface="Open Sans" panose="020B0604020202020204" charset="0"/>
+              </a:rPr>
+              <a:t>        </a:t>
+            </a:r>
+            <a:r>
+              <a:rPr lang="en-US" sz="3000" dirty="0">
+                <a:solidFill>
+                  <a:srgbClr val="6ADBD9"/>
+                </a:solidFill>
+                <a:latin typeface="Open Sans" panose="020B0604020202020204" charset="0"/>
+                <a:ea typeface="Open Sans" panose="020B0604020202020204" charset="0"/>
+                <a:cs typeface="Open Sans" panose="020B0604020202020204" charset="0"/>
+              </a:rPr>
+              <a:t>TRADING ADVISOR | </a:t>
+            </a:r>
+            <a:r>
+              <a:rPr lang="en-US" sz="3000" dirty="0">
+                <a:solidFill>
+                  <a:srgbClr val="434343"/>
+                </a:solidFill>
+                <a:latin typeface="Open Sans" panose="020B0604020202020204" charset="0"/>
+                <a:ea typeface="Open Sans" panose="020B0604020202020204" charset="0"/>
+                <a:cs typeface="Open Sans" panose="020B0604020202020204" charset="0"/>
+              </a:rPr>
+              <a:t>DADOS</a:t>
+            </a:r>
+          </a:p>
+          <a:p>
+            <a:pPr marL="0" marR="0" lvl="0" indent="0" algn="l" defTabSz="914400" rtl="0" eaLnBrk="1" fontAlgn="auto" latinLnBrk="0" hangingPunct="1">
+              <a:lnSpc>
+                <a:spcPct val="100000"/>
+              </a:lnSpc>
+              <a:spcBef>
+                <a:spcPct val="0"/>
+              </a:spcBef>
+              <a:spcAft>
+                <a:spcPts val="0"/>
+              </a:spcAft>
+              <a:buClrTx/>
+              <a:buSzTx/>
+              <a:buFontTx/>
+              <a:buNone/>
+              <a:tabLst/>
+              <a:defRPr/>
+            </a:pPr>
+            <a:endParaRPr kumimoji="0" lang="en-US" sz="2400" b="0" i="0" u="none" strike="noStrike" kern="1200" cap="none" spc="0" normalizeH="0" baseline="0" noProof="0" dirty="0">
+              <a:ln>
+                <a:noFill/>
+              </a:ln>
               <a:solidFill>
                 <a:srgbClr val="434343"/>
               </a:solidFill>
+              <a:effectLst/>
+              <a:uLnTx/>
+              <a:uFillTx/>
               <a:latin typeface="Open Sans" panose="020B0604020202020204" charset="0"/>
               <a:ea typeface="Open Sans" panose="020B0604020202020204" charset="0"/>
               <a:cs typeface="Open Sans" panose="020B0604020202020204" charset="0"/>
             </a:endParaRPr>
           </a:p>
+          <a:p>
+            <a:pPr marL="0" marR="0" lvl="0" indent="0" algn="l" defTabSz="914400" rtl="0" eaLnBrk="1" fontAlgn="auto" latinLnBrk="0" hangingPunct="1">
+              <a:lnSpc>
+                <a:spcPct val="100000"/>
+              </a:lnSpc>
+              <a:spcBef>
+                <a:spcPct val="0"/>
+              </a:spcBef>
+              <a:spcAft>
+                <a:spcPts val="0"/>
+              </a:spcAft>
+              <a:buClrTx/>
+              <a:buSzTx/>
+              <a:buFontTx/>
+              <a:buNone/>
+              <a:tabLst/>
+              <a:defRPr/>
+            </a:pPr>
+            <a:r>
+              <a:rPr kumimoji="0" lang="en-US" sz="1100" b="0" i="0" u="none" strike="noStrike" kern="1200" cap="none" spc="0" normalizeH="0" baseline="0" noProof="0" dirty="0">
+                <a:ln>
+                  <a:noFill/>
+                </a:ln>
+                <a:solidFill>
+                  <a:srgbClr val="6ADBD9"/>
+                </a:solidFill>
+                <a:effectLst/>
+                <a:uLnTx/>
+                <a:uFillTx/>
+                <a:latin typeface="Open Sans" panose="020B0604020202020204" charset="0"/>
+                <a:ea typeface="Open Sans" panose="020B0604020202020204" charset="0"/>
+                <a:cs typeface="Open Sans" panose="020B0604020202020204" charset="0"/>
+              </a:rPr>
+              <a:t>                       </a:t>
+            </a:r>
+            <a:endParaRPr kumimoji="0" lang="en-US" sz="1100" b="0" i="0" u="none" strike="noStrike" kern="1200" cap="none" spc="0" normalizeH="0" baseline="0" noProof="0" dirty="0">
+              <a:ln>
+                <a:noFill/>
+              </a:ln>
+              <a:solidFill>
+                <a:srgbClr val="434343"/>
+              </a:solidFill>
+              <a:effectLst/>
+              <a:uLnTx/>
+              <a:uFillTx/>
+              <a:latin typeface="Open Sans" panose="020B0604020202020204" charset="0"/>
+              <a:ea typeface="Open Sans" panose="020B0604020202020204" charset="0"/>
+              <a:cs typeface="Open Sans" panose="020B0604020202020204" charset="0"/>
+            </a:endParaRPr>
+          </a:p>
         </p:txBody>
       </p:sp>
-      <p:pic>
-        <p:nvPicPr>
-          <p:cNvPr id="2050" name="Picture 2" descr="Photo Of People Near Wooden Table">
+      <p:sp>
+        <p:nvSpPr>
+          <p:cNvPr id="47" name="Espaço Reservado para Número de Slide 4">
             <a:extLst>
               <a:ext uri="{FF2B5EF4-FFF2-40B4-BE49-F238E27FC236}">
-                <a16:creationId xmlns:a16="http://schemas.microsoft.com/office/drawing/2014/main" id="{1FA243AB-D387-43BF-858B-256C06F4456B}"/>
+                <a16:creationId xmlns:a16="http://schemas.microsoft.com/office/drawing/2014/main" id="{E7447111-A0E5-4121-83CE-1C881649F1ED}"/>
               </a:ext>
             </a:extLst>
           </p:cNvPr>
-          <p:cNvPicPr>
-            <a:picLocks noChangeAspect="1" noChangeArrowheads="1"/>
-          </p:cNvPicPr>
+          <p:cNvSpPr txBox="1">
+            <a:spLocks/>
+          </p:cNvSpPr>
           <p:nvPr/>
-        </p:nvPicPr>
-        <p:blipFill>
-          <a:blip r:embed="rId3" cstate="print">
-            <a:extLst>
-              <a:ext uri="{28A0092B-C50C-407E-A947-70E740481C1C}">
-                <a14:useLocalDpi xmlns:a14="http://schemas.microsoft.com/office/drawing/2010/main" val="0"/>
-              </a:ext>
-            </a:extLst>
-          </a:blip>
-          <a:srcRect/>
-          <a:stretch>
-            <a:fillRect/>
-          </a:stretch>
-        </p:blipFill>
-        <p:spPr bwMode="auto">
+        </p:nvSpPr>
+        <p:spPr>
           <a:xfrm>
-            <a:off x="0" y="1375547"/>
-            <a:ext cx="3438939" cy="2292626"/>
+            <a:off x="11430001" y="379620"/>
+            <a:ext cx="388228" cy="365125"/>
           </a:xfrm>
           <a:prstGeom prst="rect">
             <a:avLst/>
           </a:prstGeom>
-          <a:noFill/>
-          <a:extLst>
-            <a:ext uri="{909E8E84-426E-40DD-AFC4-6F175D3DCCD1}">
-              <a14:hiddenFill xmlns:a14="http://schemas.microsoft.com/office/drawing/2010/main">
-                <a:solidFill>
-                  <a:srgbClr val="FFFFFF"/>
-                </a:solidFill>
-              </a14:hiddenFill>
-            </a:ext>
-          </a:extLst>
+          <a:ln>
+            <a:noFill/>
+          </a:ln>
         </p:spPr>
-      </p:pic>
+        <p:txBody>
+          <a:bodyPr vert="horz" lIns="91440" tIns="45720" rIns="91440" bIns="45720" rtlCol="0" anchor="ctr"/>
+          <a:lstStyle>
+            <a:defPPr>
+              <a:defRPr lang="pt-BR"/>
+            </a:defPPr>
+            <a:lvl1pPr marL="0" algn="r" defTabSz="914400" rtl="0" eaLnBrk="1" latinLnBrk="0" hangingPunct="1">
+              <a:defRPr sz="1200" kern="1200">
+                <a:solidFill>
+                  <a:schemeClr val="tx1">
+                    <a:tint val="75000"/>
+                  </a:schemeClr>
+                </a:solidFill>
+                <a:latin typeface="+mn-lt"/>
+                <a:ea typeface="+mn-ea"/>
+                <a:cs typeface="+mn-cs"/>
+              </a:defRPr>
+            </a:lvl1pPr>
+            <a:lvl2pPr marL="457200" algn="l" defTabSz="914400" rtl="0" eaLnBrk="1" latinLnBrk="0" hangingPunct="1">
+              <a:defRPr sz="1800" kern="1200">
+                <a:solidFill>
+                  <a:schemeClr val="tx1"/>
+                </a:solidFill>
+                <a:latin typeface="+mn-lt"/>
+                <a:ea typeface="+mn-ea"/>
+                <a:cs typeface="+mn-cs"/>
+              </a:defRPr>
+            </a:lvl2pPr>
+            <a:lvl3pPr marL="914400" algn="l" defTabSz="914400" rtl="0" eaLnBrk="1" latinLnBrk="0" hangingPunct="1">
+              <a:defRPr sz="1800" kern="1200">
+                <a:solidFill>
+                  <a:schemeClr val="tx1"/>
+                </a:solidFill>
+                <a:latin typeface="+mn-lt"/>
+                <a:ea typeface="+mn-ea"/>
+                <a:cs typeface="+mn-cs"/>
+              </a:defRPr>
+            </a:lvl3pPr>
+            <a:lvl4pPr marL="1371600" algn="l" defTabSz="914400" rtl="0" eaLnBrk="1" latinLnBrk="0" hangingPunct="1">
+              <a:defRPr sz="1800" kern="1200">
+                <a:solidFill>
+                  <a:schemeClr val="tx1"/>
+                </a:solidFill>
+                <a:latin typeface="+mn-lt"/>
+                <a:ea typeface="+mn-ea"/>
+                <a:cs typeface="+mn-cs"/>
+              </a:defRPr>
+            </a:lvl4pPr>
+            <a:lvl5pPr marL="1828800" algn="l" defTabSz="914400" rtl="0" eaLnBrk="1" latinLnBrk="0" hangingPunct="1">
+              <a:defRPr sz="1800" kern="1200">
+                <a:solidFill>
+                  <a:schemeClr val="tx1"/>
+                </a:solidFill>
+                <a:latin typeface="+mn-lt"/>
+                <a:ea typeface="+mn-ea"/>
+                <a:cs typeface="+mn-cs"/>
+              </a:defRPr>
+            </a:lvl5pPr>
+            <a:lvl6pPr marL="2286000" algn="l" defTabSz="914400" rtl="0" eaLnBrk="1" latinLnBrk="0" hangingPunct="1">
+              <a:defRPr sz="1800" kern="1200">
+                <a:solidFill>
+                  <a:schemeClr val="tx1"/>
+                </a:solidFill>
+                <a:latin typeface="+mn-lt"/>
+                <a:ea typeface="+mn-ea"/>
+                <a:cs typeface="+mn-cs"/>
+              </a:defRPr>
+            </a:lvl6pPr>
+            <a:lvl7pPr marL="2743200" algn="l" defTabSz="914400" rtl="0" eaLnBrk="1" latinLnBrk="0" hangingPunct="1">
+              <a:defRPr sz="1800" kern="1200">
+                <a:solidFill>
+                  <a:schemeClr val="tx1"/>
+                </a:solidFill>
+                <a:latin typeface="+mn-lt"/>
+                <a:ea typeface="+mn-ea"/>
+                <a:cs typeface="+mn-cs"/>
+              </a:defRPr>
+            </a:lvl7pPr>
+            <a:lvl8pPr marL="3200400" algn="l" defTabSz="914400" rtl="0" eaLnBrk="1" latinLnBrk="0" hangingPunct="1">
+              <a:defRPr sz="1800" kern="1200">
+                <a:solidFill>
+                  <a:schemeClr val="tx1"/>
+                </a:solidFill>
+                <a:latin typeface="+mn-lt"/>
+                <a:ea typeface="+mn-ea"/>
+                <a:cs typeface="+mn-cs"/>
+              </a:defRPr>
+            </a:lvl8pPr>
+            <a:lvl9pPr marL="3657600" algn="l" defTabSz="914400" rtl="0" eaLnBrk="1" latinLnBrk="0" hangingPunct="1">
+              <a:defRPr sz="1800" kern="1200">
+                <a:solidFill>
+                  <a:schemeClr val="tx1"/>
+                </a:solidFill>
+                <a:latin typeface="+mn-lt"/>
+                <a:ea typeface="+mn-ea"/>
+                <a:cs typeface="+mn-cs"/>
+              </a:defRPr>
+            </a:lvl9pPr>
+          </a:lstStyle>
+          <a:p>
+            <a:pPr marL="0" marR="0" lvl="0" indent="0" algn="r" defTabSz="914400" rtl="0" eaLnBrk="1" fontAlgn="auto" latinLnBrk="0" hangingPunct="1">
+              <a:lnSpc>
+                <a:spcPct val="100000"/>
+              </a:lnSpc>
+              <a:spcBef>
+                <a:spcPts val="0"/>
+              </a:spcBef>
+              <a:spcAft>
+                <a:spcPts val="0"/>
+              </a:spcAft>
+              <a:buClrTx/>
+              <a:buSzTx/>
+              <a:buFontTx/>
+              <a:buNone/>
+              <a:tabLst/>
+              <a:defRPr/>
+            </a:pPr>
+            <a:fld id="{E8FB8526-A7DF-44F1-A0A0-E2C9088E1528}" type="slidenum">
+              <a:rPr kumimoji="0" lang="pt-BR" sz="1200" b="0" i="0" u="none" strike="noStrike" kern="1200" cap="none" spc="0" normalizeH="0" baseline="0" noProof="0" smtClean="0">
+                <a:ln>
+                  <a:noFill/>
+                </a:ln>
+                <a:solidFill>
+                  <a:srgbClr val="6ADBD9"/>
+                </a:solidFill>
+                <a:effectLst/>
+                <a:uLnTx/>
+                <a:uFillTx/>
+                <a:latin typeface="Calibri" panose="020F0502020204030204"/>
+                <a:ea typeface="+mn-ea"/>
+                <a:cs typeface="+mn-cs"/>
+              </a:rPr>
+              <a:pPr marL="0" marR="0" lvl="0" indent="0" algn="r" defTabSz="914400" rtl="0" eaLnBrk="1" fontAlgn="auto" latinLnBrk="0" hangingPunct="1">
+                <a:lnSpc>
+                  <a:spcPct val="100000"/>
+                </a:lnSpc>
+                <a:spcBef>
+                  <a:spcPts val="0"/>
+                </a:spcBef>
+                <a:spcAft>
+                  <a:spcPts val="0"/>
+                </a:spcAft>
+                <a:buClrTx/>
+                <a:buSzTx/>
+                <a:buFontTx/>
+                <a:buNone/>
+                <a:tabLst/>
+                <a:defRPr/>
+              </a:pPr>
+              <a:t>21</a:t>
+            </a:fld>
+            <a:endParaRPr kumimoji="0" lang="pt-BR" sz="1200" b="0" i="0" u="none" strike="noStrike" kern="1200" cap="none" spc="0" normalizeH="0" baseline="0" noProof="0" dirty="0">
+              <a:ln>
+                <a:noFill/>
+              </a:ln>
+              <a:solidFill>
+                <a:srgbClr val="6ADBD9"/>
+              </a:solidFill>
+              <a:effectLst/>
+              <a:uLnTx/>
+              <a:uFillTx/>
+              <a:latin typeface="Calibri" panose="020F0502020204030204"/>
+              <a:ea typeface="+mn-ea"/>
+              <a:cs typeface="+mn-cs"/>
+            </a:endParaRPr>
+          </a:p>
+        </p:txBody>
+      </p:sp>
       <p:sp>
         <p:nvSpPr>
-          <p:cNvPr id="9" name="Retângulo 8">
+          <p:cNvPr id="48" name="Pentágono 47">
             <a:extLst>
               <a:ext uri="{FF2B5EF4-FFF2-40B4-BE49-F238E27FC236}">
-                <a16:creationId xmlns:a16="http://schemas.microsoft.com/office/drawing/2014/main" id="{175569FF-4453-486C-9CE5-43FA6A91CB2A}"/>
+                <a16:creationId xmlns:a16="http://schemas.microsoft.com/office/drawing/2014/main" id="{C1454E66-3B3A-46A4-B1A7-0A7F2A33A910}"/>
               </a:ext>
             </a:extLst>
           </p:cNvPr>
@@ -13971,40 +14942,111 @@
         </p:nvSpPr>
         <p:spPr>
           <a:xfrm>
-            <a:off x="1538440" y="1375547"/>
-            <a:ext cx="1898401" cy="646331"/>
+            <a:off x="11529391" y="419377"/>
+            <a:ext cx="274983" cy="251791"/>
+          </a:xfrm>
+          <a:prstGeom prst="pentagon">
+            <a:avLst/>
+          </a:prstGeom>
+          <a:noFill/>
+          <a:ln>
+            <a:solidFill>
+              <a:srgbClr val="6ADBD9"/>
+            </a:solidFill>
+          </a:ln>
+        </p:spPr>
+        <p:style>
+          <a:lnRef idx="2">
+            <a:schemeClr val="accent1">
+              <a:shade val="50000"/>
+            </a:schemeClr>
+          </a:lnRef>
+          <a:fillRef idx="1">
+            <a:schemeClr val="accent1"/>
+          </a:fillRef>
+          <a:effectRef idx="0">
+            <a:schemeClr val="accent1"/>
+          </a:effectRef>
+          <a:fontRef idx="minor">
+            <a:schemeClr val="lt1"/>
+          </a:fontRef>
+        </p:style>
+        <p:txBody>
+          <a:bodyPr rtlCol="0" anchor="ctr"/>
+          <a:lstStyle/>
+          <a:p>
+            <a:pPr marL="0" marR="0" lvl="0" indent="0" algn="ctr" defTabSz="914400" rtl="0" eaLnBrk="1" fontAlgn="auto" latinLnBrk="0" hangingPunct="1">
+              <a:lnSpc>
+                <a:spcPct val="100000"/>
+              </a:lnSpc>
+              <a:spcBef>
+                <a:spcPts val="0"/>
+              </a:spcBef>
+              <a:spcAft>
+                <a:spcPts val="0"/>
+              </a:spcAft>
+              <a:buClrTx/>
+              <a:buSzTx/>
+              <a:buFontTx/>
+              <a:buNone/>
+              <a:tabLst/>
+              <a:defRPr/>
+            </a:pPr>
+            <a:endParaRPr kumimoji="0" lang="pt-BR" sz="1800" b="0" i="0" u="none" strike="noStrike" kern="1200" cap="none" spc="0" normalizeH="0" baseline="0" noProof="0">
+              <a:ln>
+                <a:noFill/>
+              </a:ln>
+              <a:solidFill>
+                <a:srgbClr val="6ADBD9"/>
+              </a:solidFill>
+              <a:effectLst/>
+              <a:uLnTx/>
+              <a:uFillTx/>
+              <a:latin typeface="Calibri" panose="020F0502020204030204"/>
+              <a:ea typeface="+mn-ea"/>
+              <a:cs typeface="+mn-cs"/>
+            </a:endParaRPr>
+          </a:p>
+        </p:txBody>
+      </p:sp>
+      <p:pic>
+        <p:nvPicPr>
+          <p:cNvPr id="20" name="Google Shape;62;p13">
+            <a:extLst>
+              <a:ext uri="{FF2B5EF4-FFF2-40B4-BE49-F238E27FC236}">
+                <a16:creationId xmlns:a16="http://schemas.microsoft.com/office/drawing/2014/main" id="{7D168EB8-243F-4975-923B-9F72F52C16BA}"/>
+              </a:ext>
+            </a:extLst>
+          </p:cNvPr>
+          <p:cNvPicPr preferRelativeResize="0"/>
+          <p:nvPr/>
+        </p:nvPicPr>
+        <p:blipFill>
+          <a:blip r:embed="rId2">
+            <a:alphaModFix/>
+          </a:blip>
+          <a:stretch>
+            <a:fillRect/>
+          </a:stretch>
+        </p:blipFill>
+        <p:spPr>
+          <a:xfrm flipH="1">
+            <a:off x="9570480" y="4722638"/>
+            <a:ext cx="2628806" cy="2116755"/>
           </a:xfrm>
           <a:prstGeom prst="rect">
             <a:avLst/>
           </a:prstGeom>
+          <a:noFill/>
+          <a:ln>
+            <a:noFill/>
+          </a:ln>
         </p:spPr>
-        <p:txBody>
-          <a:bodyPr wrap="square">
-            <a:spAutoFit/>
-          </a:bodyPr>
-          <a:lstStyle/>
-          <a:p>
-            <a:pPr algn="r"/>
-            <a:r>
-              <a:rPr lang="da-DK" dirty="0">
-                <a:solidFill>
-                  <a:schemeClr val="accent4"/>
-                </a:solidFill>
-              </a:rPr>
-              <a:t>Modificar imagem a seu critério</a:t>
-            </a:r>
-            <a:endParaRPr lang="pt-BR" dirty="0">
-              <a:solidFill>
-                <a:schemeClr val="accent4"/>
-              </a:solidFill>
-            </a:endParaRPr>
-          </a:p>
-        </p:txBody>
-      </p:sp>
+      </p:pic>
     </p:spTree>
     <p:extLst>
       <p:ext uri="{BB962C8B-B14F-4D97-AF65-F5344CB8AC3E}">
-        <p14:creationId xmlns:p14="http://schemas.microsoft.com/office/powerpoint/2010/main" val="820987417"/>
+        <p14:creationId xmlns:p14="http://schemas.microsoft.com/office/powerpoint/2010/main" val="2263097440"/>
       </p:ext>
     </p:extLst>
   </p:cSld>
@@ -16999,6 +18041,77 @@
           </a:fontRef>
         </p:style>
       </p:cxnSp>
+      <p:sp>
+        <p:nvSpPr>
+          <p:cNvPr id="44" name="Retângulo 43">
+            <a:extLst>
+              <a:ext uri="{FF2B5EF4-FFF2-40B4-BE49-F238E27FC236}">
+                <a16:creationId xmlns:a16="http://schemas.microsoft.com/office/drawing/2014/main" id="{C83618C5-76F4-B987-D7A3-9D29DDBE19C1}"/>
+              </a:ext>
+            </a:extLst>
+          </p:cNvPr>
+          <p:cNvSpPr/>
+          <p:nvPr/>
+        </p:nvSpPr>
+        <p:spPr>
+          <a:xfrm>
+            <a:off x="7305004" y="958954"/>
+            <a:ext cx="4886996" cy="773673"/>
+          </a:xfrm>
+          <a:prstGeom prst="rect">
+            <a:avLst/>
+          </a:prstGeom>
+          <a:solidFill>
+            <a:schemeClr val="bg1"/>
+          </a:solidFill>
+        </p:spPr>
+        <p:txBody>
+          <a:bodyPr wrap="square">
+            <a:spAutoFit/>
+          </a:bodyPr>
+          <a:lstStyle/>
+          <a:p>
+            <a:pPr marL="228600" indent="-228600">
+              <a:lnSpc>
+                <a:spcPct val="200000"/>
+              </a:lnSpc>
+              <a:buFont typeface="+mj-lt"/>
+              <a:buAutoNum type="arabicPeriod" startAt="4"/>
+            </a:pPr>
+            <a:r>
+              <a:rPr lang="pt-BR" sz="1200" dirty="0">
+                <a:solidFill>
+                  <a:srgbClr val="434343"/>
+                </a:solidFill>
+                <a:latin typeface="Arial" panose="020B0604020202020204" pitchFamily="34" charset="0"/>
+                <a:ea typeface="Open Sans" panose="020B0604020202020204" charset="0"/>
+                <a:cs typeface="Arial" panose="020B0604020202020204" pitchFamily="34" charset="0"/>
+              </a:rPr>
+              <a:t>Análise Exploratória (EDA)</a:t>
+            </a:r>
+          </a:p>
+          <a:p>
+            <a:pPr marL="742950" lvl="1" indent="-285750">
+              <a:lnSpc>
+                <a:spcPct val="200000"/>
+              </a:lnSpc>
+              <a:buFont typeface="+mj-lt"/>
+              <a:buAutoNum type="romanLcPeriod"/>
+            </a:pPr>
+            <a:r>
+              <a:rPr lang="pt-BR" sz="1200" dirty="0">
+                <a:solidFill>
+                  <a:srgbClr val="434343"/>
+                </a:solidFill>
+                <a:latin typeface="Arial" panose="020B0604020202020204" pitchFamily="34" charset="0"/>
+                <a:ea typeface="Open Sans" panose="020B0604020202020204" charset="0"/>
+                <a:cs typeface="Arial" panose="020B0604020202020204" pitchFamily="34" charset="0"/>
+              </a:rPr>
+              <a:t>Dados fundamentalistas</a:t>
+            </a:r>
+          </a:p>
+        </p:txBody>
+      </p:sp>
     </p:spTree>
     <p:extLst>
       <p:ext uri="{BB962C8B-B14F-4D97-AF65-F5344CB8AC3E}">
@@ -17031,15 +18144,15 @@
       </p:grpSpPr>
       <p:pic>
         <p:nvPicPr>
-          <p:cNvPr id="6" name="Imagem 5" descr="Interface gráfica do usuário, Gráfico">
+          <p:cNvPr id="5126" name="Picture 6">
             <a:extLst>
               <a:ext uri="{FF2B5EF4-FFF2-40B4-BE49-F238E27FC236}">
-                <a16:creationId xmlns:a16="http://schemas.microsoft.com/office/drawing/2014/main" id="{758F0BF9-5AA2-F873-F298-70A4C5D45306}"/>
+                <a16:creationId xmlns:a16="http://schemas.microsoft.com/office/drawing/2014/main" id="{61AE5729-C2A3-AFC1-659A-8C7BF4A88217}"/>
               </a:ext>
             </a:extLst>
           </p:cNvPr>
           <p:cNvPicPr>
-            <a:picLocks noChangeAspect="1"/>
+            <a:picLocks noChangeAspect="1" noChangeArrowheads="1"/>
           </p:cNvPicPr>
           <p:nvPr/>
         </p:nvPicPr>
@@ -17049,23 +18162,31 @@
               <a:ext uri="{28A0092B-C50C-407E-A947-70E740481C1C}">
                 <a14:useLocalDpi xmlns:a14="http://schemas.microsoft.com/office/drawing/2010/main" val="0"/>
               </a:ext>
-              <a:ext uri="{837473B0-CC2E-450A-ABE3-18F120FF3D39}">
-                <a1611:picAttrSrcUrl xmlns:a1611="http://schemas.microsoft.com/office/drawing/2016/11/main" r:id="rId3"/>
-              </a:ext>
             </a:extLst>
           </a:blip>
+          <a:srcRect/>
           <a:stretch>
             <a:fillRect/>
           </a:stretch>
         </p:blipFill>
-        <p:spPr>
+        <p:spPr bwMode="auto">
           <a:xfrm>
-            <a:off x="0" y="-15900"/>
-            <a:ext cx="3337264" cy="6873900"/>
+            <a:off x="-10759" y="-15900"/>
+            <a:ext cx="3442448" cy="6954582"/>
           </a:xfrm>
           <a:prstGeom prst="rect">
             <a:avLst/>
           </a:prstGeom>
+          <a:noFill/>
+          <a:extLst>
+            <a:ext uri="{909E8E84-426E-40DD-AFC4-6F175D3DCCD1}">
+              <a14:hiddenFill xmlns:a14="http://schemas.microsoft.com/office/drawing/2010/main">
+                <a:solidFill>
+                  <a:srgbClr val="FFFFFF"/>
+                </a:solidFill>
+              </a14:hiddenFill>
+            </a:ext>
+          </a:extLst>
         </p:spPr>
       </p:pic>
       <p:sp>
@@ -17283,15 +18404,15 @@
       </p:grpSpPr>
       <p:pic>
         <p:nvPicPr>
-          <p:cNvPr id="3" name="Imagem 2" descr="Tela de jogo de vídeo game">
+          <p:cNvPr id="6146" name="Picture 2" descr="Foto grátis colagem do conceito de banner de finanças">
             <a:extLst>
               <a:ext uri="{FF2B5EF4-FFF2-40B4-BE49-F238E27FC236}">
-                <a16:creationId xmlns:a16="http://schemas.microsoft.com/office/drawing/2014/main" id="{21DC0336-5F09-0050-3610-EE129FCAADCE}"/>
+                <a16:creationId xmlns:a16="http://schemas.microsoft.com/office/drawing/2014/main" id="{5C6D74C5-24BF-ED9E-1369-4567F3D7DA76}"/>
               </a:ext>
             </a:extLst>
           </p:cNvPr>
           <p:cNvPicPr>
-            <a:picLocks noChangeAspect="1"/>
+            <a:picLocks noChangeAspect="1" noChangeArrowheads="1"/>
           </p:cNvPicPr>
           <p:nvPr/>
         </p:nvPicPr>
@@ -17301,23 +18422,31 @@
               <a:ext uri="{28A0092B-C50C-407E-A947-70E740481C1C}">
                 <a14:useLocalDpi xmlns:a14="http://schemas.microsoft.com/office/drawing/2010/main" val="0"/>
               </a:ext>
-              <a:ext uri="{837473B0-CC2E-450A-ABE3-18F120FF3D39}">
-                <a1611:picAttrSrcUrl xmlns:a1611="http://schemas.microsoft.com/office/drawing/2016/11/main" r:id="rId3"/>
-              </a:ext>
             </a:extLst>
           </a:blip>
+          <a:srcRect/>
           <a:stretch>
             <a:fillRect/>
           </a:stretch>
         </p:blipFill>
-        <p:spPr>
+        <p:spPr bwMode="auto">
           <a:xfrm>
-            <a:off x="-44107" y="-1"/>
-            <a:ext cx="3231908" cy="6887817"/>
+            <a:off x="-86061" y="0"/>
+            <a:ext cx="3560781" cy="6886988"/>
           </a:xfrm>
           <a:prstGeom prst="rect">
             <a:avLst/>
           </a:prstGeom>
+          <a:noFill/>
+          <a:extLst>
+            <a:ext uri="{909E8E84-426E-40DD-AFC4-6F175D3DCCD1}">
+              <a14:hiddenFill xmlns:a14="http://schemas.microsoft.com/office/drawing/2010/main">
+                <a:solidFill>
+                  <a:srgbClr val="FFFFFF"/>
+                </a:solidFill>
+              </a14:hiddenFill>
+            </a:ext>
+          </a:extLst>
         </p:spPr>
       </p:pic>
       <p:sp>
@@ -17430,7 +18559,7 @@
         </p:nvSpPr>
         <p:spPr>
           <a:xfrm>
-            <a:off x="3820112" y="982176"/>
+            <a:off x="3723292" y="1027067"/>
             <a:ext cx="7882361" cy="5262979"/>
           </a:xfrm>
           <a:prstGeom prst="rect">
@@ -17577,7 +18706,7 @@
                 <a:latin typeface="Open Sans" panose="020B0606030504020204" pitchFamily="34" charset="0"/>
                 <a:ea typeface="Open Sans" panose="020B0606030504020204" pitchFamily="34" charset="0"/>
                 <a:cs typeface="Open Sans" panose="020B0606030504020204" pitchFamily="34" charset="0"/>
-                <a:hlinkClick r:id="rId4"/>
+                <a:hlinkClick r:id="rId3"/>
               </a:rPr>
               <a:t>Cresce número de investidores brasileiros em 2022 e perspectiva para 2023 é de novo aumento – ANBIMA</a:t>
             </a:r>
@@ -17634,15 +18763,15 @@
       </p:grpSpPr>
       <p:pic>
         <p:nvPicPr>
-          <p:cNvPr id="9" name="Imagem 8" descr="Uma imagem contendo Interface gráfica do usuário">
+          <p:cNvPr id="7172" name="Picture 4" descr="Colagem do conceito de banner de finanças">
             <a:extLst>
               <a:ext uri="{FF2B5EF4-FFF2-40B4-BE49-F238E27FC236}">
-                <a16:creationId xmlns:a16="http://schemas.microsoft.com/office/drawing/2014/main" id="{074B9F24-B361-3D56-10E0-CE327CF1BA6C}"/>
+                <a16:creationId xmlns:a16="http://schemas.microsoft.com/office/drawing/2014/main" id="{09015E67-ADC4-3D30-EC90-B9CA73D71809}"/>
               </a:ext>
             </a:extLst>
           </p:cNvPr>
           <p:cNvPicPr>
-            <a:picLocks noChangeAspect="1"/>
+            <a:picLocks noChangeAspect="1" noChangeArrowheads="1"/>
           </p:cNvPicPr>
           <p:nvPr/>
         </p:nvPicPr>
@@ -17652,23 +18781,31 @@
               <a:ext uri="{28A0092B-C50C-407E-A947-70E740481C1C}">
                 <a14:useLocalDpi xmlns:a14="http://schemas.microsoft.com/office/drawing/2010/main" val="0"/>
               </a:ext>
-              <a:ext uri="{837473B0-CC2E-450A-ABE3-18F120FF3D39}">
-                <a1611:picAttrSrcUrl xmlns:a1611="http://schemas.microsoft.com/office/drawing/2016/11/main" r:id="rId3"/>
-              </a:ext>
             </a:extLst>
           </a:blip>
+          <a:srcRect/>
           <a:stretch>
             <a:fillRect/>
           </a:stretch>
         </p:blipFill>
-        <p:spPr>
+        <p:spPr bwMode="auto">
           <a:xfrm>
-            <a:off x="0" y="-2099"/>
-            <a:ext cx="3231909" cy="6860099"/>
+            <a:off x="-96819" y="-1"/>
+            <a:ext cx="3646843" cy="6981713"/>
           </a:xfrm>
           <a:prstGeom prst="rect">
             <a:avLst/>
           </a:prstGeom>
+          <a:noFill/>
+          <a:extLst>
+            <a:ext uri="{909E8E84-426E-40DD-AFC4-6F175D3DCCD1}">
+              <a14:hiddenFill xmlns:a14="http://schemas.microsoft.com/office/drawing/2010/main">
+                <a:solidFill>
+                  <a:srgbClr val="FFFFFF"/>
+                </a:solidFill>
+              </a14:hiddenFill>
+            </a:ext>
+          </a:extLst>
         </p:spPr>
       </p:pic>
       <p:sp>

</xml_diff>